<commit_message>
Fix error with font
</commit_message>
<xml_diff>
--- a/presentations/java_future.pptx
+++ b/presentations/java_future.pptx
@@ -8026,8 +8026,8 @@
         </p:nvSpPr>
         <p:spPr>
           <a:xfrm>
-            <a:off x="683615" y="4263629"/>
-            <a:ext cx="2697502" cy="369332"/>
+            <a:off x="683895" y="4263390"/>
+            <a:ext cx="3964305" cy="368300"/>
           </a:xfrm>
           <a:prstGeom prst="rect">
             <a:avLst/>
@@ -8073,8 +8073,8 @@
         </p:nvSpPr>
         <p:spPr>
           <a:xfrm>
-            <a:off x="698873" y="3850363"/>
-            <a:ext cx="1524000" cy="369332"/>
+            <a:off x="699135" y="3850640"/>
+            <a:ext cx="3949700" cy="368300"/>
           </a:xfrm>
           <a:prstGeom prst="rect">
             <a:avLst/>
@@ -17456,19 +17456,19 @@
                 <a:solidFill>
                   <a:srgbClr val="02A9F7"/>
                 </a:solidFill>
-                <a:latin typeface="Abadi MT Condensed Light" charset="0"/>
+                <a:latin typeface="Adobe Arabic" panose="02040503050201020203" charset="0"/>
                 <a:ea typeface="Abadi MT Condensed Light" charset="0"/>
-                <a:cs typeface="Abadi MT Condensed Light" charset="0"/>
+                <a:cs typeface="Adobe Arabic" panose="02040503050201020203" charset="0"/>
               </a:rPr>
               <a:t>Amazon|20$|Gold</a:t>
             </a:r>
-            <a:endParaRPr lang="en-US" b="1" i="1" dirty="0">
+            <a:endParaRPr lang="en-US" b="1" i="1" dirty="0" smtClean="0">
               <a:solidFill>
                 <a:srgbClr val="02A9F7"/>
               </a:solidFill>
-              <a:latin typeface="Abadi MT Condensed Light" charset="0"/>
+              <a:latin typeface="Adobe Arabic" panose="02040503050201020203" charset="0"/>
               <a:ea typeface="Abadi MT Condensed Light" charset="0"/>
-              <a:cs typeface="Abadi MT Condensed Light" charset="0"/>
+              <a:cs typeface="Adobe Arabic" panose="02040503050201020203" charset="0"/>
             </a:endParaRPr>
           </a:p>
         </p:txBody>
@@ -17482,7 +17482,7 @@
         <p:spPr>
           <a:xfrm>
             <a:off x="9982200" y="2904796"/>
-            <a:ext cx="2286000" cy="369332"/>
+            <a:ext cx="2286000" cy="368300"/>
           </a:xfrm>
           <a:prstGeom prst="rect">
             <a:avLst/>
@@ -17504,19 +17504,19 @@
                 <a:solidFill>
                   <a:srgbClr val="D78000"/>
                 </a:solidFill>
-                <a:latin typeface="Abadi MT Condensed Light" charset="0"/>
+                <a:latin typeface="Adobe Arabic" panose="02040503050201020203" charset="0"/>
                 <a:ea typeface="Abadi MT Condensed Light" charset="0"/>
-                <a:cs typeface="Abadi MT Condensed Light" charset="0"/>
+                <a:cs typeface="Adobe Arabic" panose="02040503050201020203" charset="0"/>
               </a:rPr>
               <a:t>Price: 20|Discount: Gold</a:t>
             </a:r>
-            <a:endParaRPr lang="en-US" b="1" i="1" dirty="0">
+            <a:endParaRPr lang="en-US" b="1" i="1" dirty="0" smtClean="0">
               <a:solidFill>
                 <a:srgbClr val="D78000"/>
               </a:solidFill>
-              <a:latin typeface="Abadi MT Condensed Light" charset="0"/>
+              <a:latin typeface="Adobe Arabic" panose="02040503050201020203" charset="0"/>
               <a:ea typeface="Abadi MT Condensed Light" charset="0"/>
-              <a:cs typeface="Abadi MT Condensed Light" charset="0"/>
+              <a:cs typeface="Adobe Arabic" panose="02040503050201020203" charset="0"/>
             </a:endParaRPr>
           </a:p>
         </p:txBody>
@@ -30780,9 +30780,136 @@
   <p:timing>
     <p:tnLst>
       <p:par>
-        <p:cTn id="1" dur="indefinite" restart="never" nodeType="tmRoot"/>
+        <p:cTn id="1" dur="indefinite" restart="never" nodeType="tmRoot">
+          <p:childTnLst>
+            <p:seq concurrent="1" nextAc="seek">
+              <p:cTn id="2" dur="indefinite" nodeType="mainSeq">
+                <p:childTnLst>
+                  <p:par>
+                    <p:cTn id="3" fill="hold">
+                      <p:stCondLst>
+                        <p:cond delay="indefinite"/>
+                      </p:stCondLst>
+                      <p:childTnLst>
+                        <p:par>
+                          <p:cTn id="4" fill="hold">
+                            <p:stCondLst>
+                              <p:cond delay="0"/>
+                            </p:stCondLst>
+                            <p:childTnLst>
+                              <p:par>
+                                <p:cTn id="5" presetID="1" presetClass="entr" presetSubtype="0" fill="hold" grpId="0" nodeType="clickEffect">
+                                  <p:stCondLst>
+                                    <p:cond delay="0"/>
+                                  </p:stCondLst>
+                                  <p:childTnLst>
+                                    <p:set>
+                                      <p:cBhvr>
+                                        <p:cTn id="6" dur="1" fill="hold">
+                                          <p:stCondLst>
+                                            <p:cond delay="0"/>
+                                          </p:stCondLst>
+                                        </p:cTn>
+                                        <p:tgtEl>
+                                          <p:spTgt spid="11"/>
+                                        </p:tgtEl>
+                                        <p:attrNameLst>
+                                          <p:attrName>style.visibility</p:attrName>
+                                        </p:attrNameLst>
+                                      </p:cBhvr>
+                                      <p:to>
+                                        <p:strVal val="visible"/>
+                                      </p:to>
+                                    </p:set>
+                                  </p:childTnLst>
+                                </p:cTn>
+                              </p:par>
+                              <p:par>
+                                <p:cTn id="7" presetID="1" presetClass="entr" presetSubtype="0" fill="hold" grpId="0" nodeType="withEffect">
+                                  <p:stCondLst>
+                                    <p:cond delay="0"/>
+                                  </p:stCondLst>
+                                  <p:childTnLst>
+                                    <p:set>
+                                      <p:cBhvr>
+                                        <p:cTn id="8" dur="1" fill="hold">
+                                          <p:stCondLst>
+                                            <p:cond delay="0"/>
+                                          </p:stCondLst>
+                                        </p:cTn>
+                                        <p:tgtEl>
+                                          <p:spTgt spid="12"/>
+                                        </p:tgtEl>
+                                        <p:attrNameLst>
+                                          <p:attrName>style.visibility</p:attrName>
+                                        </p:attrNameLst>
+                                      </p:cBhvr>
+                                      <p:to>
+                                        <p:strVal val="visible"/>
+                                      </p:to>
+                                    </p:set>
+                                  </p:childTnLst>
+                                </p:cTn>
+                              </p:par>
+                              <p:par>
+                                <p:cTn id="9" presetID="1" presetClass="entr" presetSubtype="0" fill="hold" grpId="0" nodeType="withEffect">
+                                  <p:stCondLst>
+                                    <p:cond delay="0"/>
+                                  </p:stCondLst>
+                                  <p:childTnLst>
+                                    <p:set>
+                                      <p:cBhvr>
+                                        <p:cTn id="10" dur="1" fill="hold">
+                                          <p:stCondLst>
+                                            <p:cond delay="0"/>
+                                          </p:stCondLst>
+                                        </p:cTn>
+                                        <p:tgtEl>
+                                          <p:spTgt spid="14"/>
+                                        </p:tgtEl>
+                                        <p:attrNameLst>
+                                          <p:attrName>style.visibility</p:attrName>
+                                        </p:attrNameLst>
+                                      </p:cBhvr>
+                                      <p:to>
+                                        <p:strVal val="visible"/>
+                                      </p:to>
+                                    </p:set>
+                                  </p:childTnLst>
+                                </p:cTn>
+                              </p:par>
+                            </p:childTnLst>
+                          </p:cTn>
+                        </p:par>
+                      </p:childTnLst>
+                    </p:cTn>
+                  </p:par>
+                </p:childTnLst>
+              </p:cTn>
+              <p:prevCondLst>
+                <p:cond evt="onPrev" delay="0">
+                  <p:tgtEl>
+                    <p:sldTgt/>
+                  </p:tgtEl>
+                </p:cond>
+              </p:prevCondLst>
+              <p:nextCondLst>
+                <p:cond evt="onNext" delay="0">
+                  <p:tgtEl>
+                    <p:sldTgt/>
+                  </p:tgtEl>
+                </p:cond>
+              </p:nextCondLst>
+            </p:seq>
+          </p:childTnLst>
+        </p:cTn>
       </p:par>
     </p:tnLst>
+    <p:bldLst>
+      <p:bldP spid="11" grpId="0"/>
+      <p:bldP spid="12" grpId="0"/>
+      <p:bldP spid="14" grpId="0"/>
+    </p:bldLst>
   </p:timing>
 </p:sld>
 </file>
@@ -31422,45 +31549,6 @@
           </a:p>
         </p:txBody>
       </p:sp>
-      <p:cxnSp>
-        <p:nvCxnSpPr>
-          <p:cNvPr id="37" name="Straight Connector 36"/>
-          <p:cNvCxnSpPr/>
-          <p:nvPr/>
-        </p:nvCxnSpPr>
-        <p:spPr>
-          <a:xfrm>
-            <a:off x="5105400" y="379730"/>
-            <a:ext cx="0" cy="6120709"/>
-          </a:xfrm>
-          <a:prstGeom prst="line">
-            <a:avLst/>
-          </a:prstGeom>
-          <a:ln w="25400">
-            <a:solidFill>
-              <a:schemeClr val="tx1">
-                <a:lumMod val="50000"/>
-              </a:schemeClr>
-            </a:solidFill>
-            <a:headEnd type="none" w="med" len="med"/>
-            <a:tailEnd type="triangle" w="med" len="med"/>
-          </a:ln>
-        </p:spPr>
-        <p:style>
-          <a:lnRef idx="1">
-            <a:schemeClr val="accent1"/>
-          </a:lnRef>
-          <a:fillRef idx="0">
-            <a:schemeClr val="accent1"/>
-          </a:fillRef>
-          <a:effectRef idx="0">
-            <a:schemeClr val="accent1"/>
-          </a:effectRef>
-          <a:fontRef idx="minor">
-            <a:schemeClr val="tx1"/>
-          </a:fontRef>
-        </p:style>
-      </p:cxnSp>
       <p:sp>
         <p:nvSpPr>
           <p:cNvPr id="38" name="Rounded Rectangle 37"/>
@@ -32673,8 +32761,8 @@
         </p:nvSpPr>
         <p:spPr>
           <a:xfrm>
-            <a:off x="9734549" y="1537725"/>
-            <a:ext cx="2819400" cy="369332"/>
+            <a:off x="9734550" y="1537970"/>
+            <a:ext cx="1420495" cy="368300"/>
           </a:xfrm>
           <a:prstGeom prst="rect">
             <a:avLst/>
@@ -33140,9 +33228,510 @@
   <p:timing>
     <p:tnLst>
       <p:par>
-        <p:cTn id="1" dur="indefinite" restart="never" nodeType="tmRoot"/>
+        <p:cTn id="1" dur="indefinite" restart="never" nodeType="tmRoot">
+          <p:childTnLst>
+            <p:seq concurrent="1" nextAc="seek">
+              <p:cTn id="2" dur="indefinite" nodeType="mainSeq">
+                <p:childTnLst>
+                  <p:par>
+                    <p:cTn id="3" fill="hold">
+                      <p:stCondLst>
+                        <p:cond delay="indefinite"/>
+                      </p:stCondLst>
+                      <p:childTnLst>
+                        <p:par>
+                          <p:cTn id="4" fill="hold">
+                            <p:stCondLst>
+                              <p:cond delay="0"/>
+                            </p:stCondLst>
+                            <p:childTnLst>
+                              <p:par>
+                                <p:cTn id="5" presetID="1" presetClass="entr" presetSubtype="0" fill="hold" grpId="0" nodeType="clickEffect">
+                                  <p:stCondLst>
+                                    <p:cond delay="0"/>
+                                  </p:stCondLst>
+                                  <p:childTnLst>
+                                    <p:set>
+                                      <p:cBhvr>
+                                        <p:cTn id="6" dur="1" fill="hold">
+                                          <p:stCondLst>
+                                            <p:cond delay="0"/>
+                                          </p:stCondLst>
+                                        </p:cTn>
+                                        <p:tgtEl>
+                                          <p:spTgt spid="89"/>
+                                        </p:tgtEl>
+                                        <p:attrNameLst>
+                                          <p:attrName>style.visibility</p:attrName>
+                                        </p:attrNameLst>
+                                      </p:cBhvr>
+                                      <p:to>
+                                        <p:strVal val="visible"/>
+                                      </p:to>
+                                    </p:set>
+                                  </p:childTnLst>
+                                </p:cTn>
+                              </p:par>
+                              <p:par>
+                                <p:cTn id="7" presetID="1" presetClass="entr" presetSubtype="0" fill="hold" grpId="0" nodeType="withEffect">
+                                  <p:stCondLst>
+                                    <p:cond delay="0"/>
+                                  </p:stCondLst>
+                                  <p:childTnLst>
+                                    <p:set>
+                                      <p:cBhvr>
+                                        <p:cTn id="8" dur="1" fill="hold">
+                                          <p:stCondLst>
+                                            <p:cond delay="0"/>
+                                          </p:stCondLst>
+                                        </p:cTn>
+                                        <p:tgtEl>
+                                          <p:spTgt spid="90"/>
+                                        </p:tgtEl>
+                                        <p:attrNameLst>
+                                          <p:attrName>style.visibility</p:attrName>
+                                        </p:attrNameLst>
+                                      </p:cBhvr>
+                                      <p:to>
+                                        <p:strVal val="visible"/>
+                                      </p:to>
+                                    </p:set>
+                                  </p:childTnLst>
+                                </p:cTn>
+                              </p:par>
+                              <p:par>
+                                <p:cTn id="9" presetID="1" presetClass="entr" presetSubtype="0" fill="hold" grpId="0" nodeType="withEffect">
+                                  <p:stCondLst>
+                                    <p:cond delay="0"/>
+                                  </p:stCondLst>
+                                  <p:childTnLst>
+                                    <p:set>
+                                      <p:cBhvr>
+                                        <p:cTn id="10" dur="1" fill="hold">
+                                          <p:stCondLst>
+                                            <p:cond delay="0"/>
+                                          </p:stCondLst>
+                                        </p:cTn>
+                                        <p:tgtEl>
+                                          <p:spTgt spid="91"/>
+                                        </p:tgtEl>
+                                        <p:attrNameLst>
+                                          <p:attrName>style.visibility</p:attrName>
+                                        </p:attrNameLst>
+                                      </p:cBhvr>
+                                      <p:to>
+                                        <p:strVal val="visible"/>
+                                      </p:to>
+                                    </p:set>
+                                  </p:childTnLst>
+                                </p:cTn>
+                              </p:par>
+                              <p:par>
+                                <p:cTn id="11" presetID="1" presetClass="entr" presetSubtype="0" fill="hold" grpId="0" nodeType="withEffect">
+                                  <p:stCondLst>
+                                    <p:cond delay="0"/>
+                                  </p:stCondLst>
+                                  <p:childTnLst>
+                                    <p:set>
+                                      <p:cBhvr>
+                                        <p:cTn id="12" dur="1" fill="hold">
+                                          <p:stCondLst>
+                                            <p:cond delay="0"/>
+                                          </p:stCondLst>
+                                        </p:cTn>
+                                        <p:tgtEl>
+                                          <p:spTgt spid="92"/>
+                                        </p:tgtEl>
+                                        <p:attrNameLst>
+                                          <p:attrName>style.visibility</p:attrName>
+                                        </p:attrNameLst>
+                                      </p:cBhvr>
+                                      <p:to>
+                                        <p:strVal val="visible"/>
+                                      </p:to>
+                                    </p:set>
+                                  </p:childTnLst>
+                                </p:cTn>
+                              </p:par>
+                              <p:par>
+                                <p:cTn id="13" presetID="1" presetClass="entr" presetSubtype="0" fill="hold" grpId="0" nodeType="withEffect">
+                                  <p:stCondLst>
+                                    <p:cond delay="0"/>
+                                  </p:stCondLst>
+                                  <p:childTnLst>
+                                    <p:set>
+                                      <p:cBhvr>
+                                        <p:cTn id="14" dur="1" fill="hold">
+                                          <p:stCondLst>
+                                            <p:cond delay="0"/>
+                                          </p:stCondLst>
+                                        </p:cTn>
+                                        <p:tgtEl>
+                                          <p:spTgt spid="93"/>
+                                        </p:tgtEl>
+                                        <p:attrNameLst>
+                                          <p:attrName>style.visibility</p:attrName>
+                                        </p:attrNameLst>
+                                      </p:cBhvr>
+                                      <p:to>
+                                        <p:strVal val="visible"/>
+                                      </p:to>
+                                    </p:set>
+                                  </p:childTnLst>
+                                </p:cTn>
+                              </p:par>
+                              <p:par>
+                                <p:cTn id="15" presetID="1" presetClass="entr" presetSubtype="0" fill="hold" grpId="0" nodeType="withEffect">
+                                  <p:stCondLst>
+                                    <p:cond delay="0"/>
+                                  </p:stCondLst>
+                                  <p:childTnLst>
+                                    <p:set>
+                                      <p:cBhvr>
+                                        <p:cTn id="16" dur="1" fill="hold">
+                                          <p:stCondLst>
+                                            <p:cond delay="0"/>
+                                          </p:stCondLst>
+                                        </p:cTn>
+                                        <p:tgtEl>
+                                          <p:spTgt spid="94"/>
+                                        </p:tgtEl>
+                                        <p:attrNameLst>
+                                          <p:attrName>style.visibility</p:attrName>
+                                        </p:attrNameLst>
+                                      </p:cBhvr>
+                                      <p:to>
+                                        <p:strVal val="visible"/>
+                                      </p:to>
+                                    </p:set>
+                                  </p:childTnLst>
+                                </p:cTn>
+                              </p:par>
+                              <p:par>
+                                <p:cTn id="17" presetID="1" presetClass="entr" presetSubtype="0" fill="hold" grpId="0" nodeType="withEffect">
+                                  <p:stCondLst>
+                                    <p:cond delay="0"/>
+                                  </p:stCondLst>
+                                  <p:childTnLst>
+                                    <p:set>
+                                      <p:cBhvr>
+                                        <p:cTn id="18" dur="1" fill="hold">
+                                          <p:stCondLst>
+                                            <p:cond delay="0"/>
+                                          </p:stCondLst>
+                                        </p:cTn>
+                                        <p:tgtEl>
+                                          <p:spTgt spid="95"/>
+                                        </p:tgtEl>
+                                        <p:attrNameLst>
+                                          <p:attrName>style.visibility</p:attrName>
+                                        </p:attrNameLst>
+                                      </p:cBhvr>
+                                      <p:to>
+                                        <p:strVal val="visible"/>
+                                      </p:to>
+                                    </p:set>
+                                  </p:childTnLst>
+                                </p:cTn>
+                              </p:par>
+                              <p:par>
+                                <p:cTn id="19" presetID="1" presetClass="entr" presetSubtype="0" fill="hold" grpId="0" nodeType="withEffect">
+                                  <p:stCondLst>
+                                    <p:cond delay="0"/>
+                                  </p:stCondLst>
+                                  <p:childTnLst>
+                                    <p:set>
+                                      <p:cBhvr>
+                                        <p:cTn id="20" dur="1" fill="hold">
+                                          <p:stCondLst>
+                                            <p:cond delay="0"/>
+                                          </p:stCondLst>
+                                        </p:cTn>
+                                        <p:tgtEl>
+                                          <p:spTgt spid="96"/>
+                                        </p:tgtEl>
+                                        <p:attrNameLst>
+                                          <p:attrName>style.visibility</p:attrName>
+                                        </p:attrNameLst>
+                                      </p:cBhvr>
+                                      <p:to>
+                                        <p:strVal val="visible"/>
+                                      </p:to>
+                                    </p:set>
+                                  </p:childTnLst>
+                                </p:cTn>
+                              </p:par>
+                              <p:par>
+                                <p:cTn id="21" presetID="1" presetClass="entr" presetSubtype="0" fill="hold" grpId="0" nodeType="withEffect">
+                                  <p:stCondLst>
+                                    <p:cond delay="0"/>
+                                  </p:stCondLst>
+                                  <p:childTnLst>
+                                    <p:set>
+                                      <p:cBhvr>
+                                        <p:cTn id="22" dur="1" fill="hold">
+                                          <p:stCondLst>
+                                            <p:cond delay="0"/>
+                                          </p:stCondLst>
+                                        </p:cTn>
+                                        <p:tgtEl>
+                                          <p:spTgt spid="97"/>
+                                        </p:tgtEl>
+                                        <p:attrNameLst>
+                                          <p:attrName>style.visibility</p:attrName>
+                                        </p:attrNameLst>
+                                      </p:cBhvr>
+                                      <p:to>
+                                        <p:strVal val="visible"/>
+                                      </p:to>
+                                    </p:set>
+                                  </p:childTnLst>
+                                </p:cTn>
+                              </p:par>
+                              <p:par>
+                                <p:cTn id="23" presetID="1" presetClass="entr" presetSubtype="0" fill="hold" grpId="0" nodeType="withEffect">
+                                  <p:stCondLst>
+                                    <p:cond delay="0"/>
+                                  </p:stCondLst>
+                                  <p:childTnLst>
+                                    <p:set>
+                                      <p:cBhvr>
+                                        <p:cTn id="24" dur="1" fill="hold">
+                                          <p:stCondLst>
+                                            <p:cond delay="0"/>
+                                          </p:stCondLst>
+                                        </p:cTn>
+                                        <p:tgtEl>
+                                          <p:spTgt spid="98"/>
+                                        </p:tgtEl>
+                                        <p:attrNameLst>
+                                          <p:attrName>style.visibility</p:attrName>
+                                        </p:attrNameLst>
+                                      </p:cBhvr>
+                                      <p:to>
+                                        <p:strVal val="visible"/>
+                                      </p:to>
+                                    </p:set>
+                                  </p:childTnLst>
+                                </p:cTn>
+                              </p:par>
+                              <p:par>
+                                <p:cTn id="25" presetID="1" presetClass="entr" presetSubtype="0" fill="hold" grpId="0" nodeType="withEffect">
+                                  <p:stCondLst>
+                                    <p:cond delay="0"/>
+                                  </p:stCondLst>
+                                  <p:childTnLst>
+                                    <p:set>
+                                      <p:cBhvr>
+                                        <p:cTn id="26" dur="1" fill="hold">
+                                          <p:stCondLst>
+                                            <p:cond delay="0"/>
+                                          </p:stCondLst>
+                                        </p:cTn>
+                                        <p:tgtEl>
+                                          <p:spTgt spid="99"/>
+                                        </p:tgtEl>
+                                        <p:attrNameLst>
+                                          <p:attrName>style.visibility</p:attrName>
+                                        </p:attrNameLst>
+                                      </p:cBhvr>
+                                      <p:to>
+                                        <p:strVal val="visible"/>
+                                      </p:to>
+                                    </p:set>
+                                  </p:childTnLst>
+                                </p:cTn>
+                              </p:par>
+                              <p:par>
+                                <p:cTn id="27" presetID="1" presetClass="entr" presetSubtype="0" fill="hold" grpId="0" nodeType="withEffect">
+                                  <p:stCondLst>
+                                    <p:cond delay="0"/>
+                                  </p:stCondLst>
+                                  <p:childTnLst>
+                                    <p:set>
+                                      <p:cBhvr>
+                                        <p:cTn id="28" dur="1" fill="hold">
+                                          <p:stCondLst>
+                                            <p:cond delay="0"/>
+                                          </p:stCondLst>
+                                        </p:cTn>
+                                        <p:tgtEl>
+                                          <p:spTgt spid="101"/>
+                                        </p:tgtEl>
+                                        <p:attrNameLst>
+                                          <p:attrName>style.visibility</p:attrName>
+                                        </p:attrNameLst>
+                                      </p:cBhvr>
+                                      <p:to>
+                                        <p:strVal val="visible"/>
+                                      </p:to>
+                                    </p:set>
+                                  </p:childTnLst>
+                                </p:cTn>
+                              </p:par>
+                              <p:par>
+                                <p:cTn id="29" presetID="1" presetClass="entr" presetSubtype="0" fill="hold" grpId="0" nodeType="withEffect">
+                                  <p:stCondLst>
+                                    <p:cond delay="0"/>
+                                  </p:stCondLst>
+                                  <p:childTnLst>
+                                    <p:set>
+                                      <p:cBhvr>
+                                        <p:cTn id="30" dur="1" fill="hold">
+                                          <p:stCondLst>
+                                            <p:cond delay="0"/>
+                                          </p:stCondLst>
+                                        </p:cTn>
+                                        <p:tgtEl>
+                                          <p:spTgt spid="105"/>
+                                        </p:tgtEl>
+                                        <p:attrNameLst>
+                                          <p:attrName>style.visibility</p:attrName>
+                                        </p:attrNameLst>
+                                      </p:cBhvr>
+                                      <p:to>
+                                        <p:strVal val="visible"/>
+                                      </p:to>
+                                    </p:set>
+                                  </p:childTnLst>
+                                </p:cTn>
+                              </p:par>
+                              <p:par>
+                                <p:cTn id="31" presetID="1" presetClass="entr" presetSubtype="0" fill="hold" nodeType="withEffect">
+                                  <p:stCondLst>
+                                    <p:cond delay="0"/>
+                                  </p:stCondLst>
+                                  <p:childTnLst>
+                                    <p:set>
+                                      <p:cBhvr>
+                                        <p:cTn id="32" dur="1" fill="hold">
+                                          <p:stCondLst>
+                                            <p:cond delay="0"/>
+                                          </p:stCondLst>
+                                        </p:cTn>
+                                        <p:tgtEl>
+                                          <p:spTgt spid="8"/>
+                                        </p:tgtEl>
+                                        <p:attrNameLst>
+                                          <p:attrName>style.visibility</p:attrName>
+                                        </p:attrNameLst>
+                                      </p:cBhvr>
+                                      <p:to>
+                                        <p:strVal val="visible"/>
+                                      </p:to>
+                                    </p:set>
+                                  </p:childTnLst>
+                                </p:cTn>
+                              </p:par>
+                              <p:par>
+                                <p:cTn id="33" presetID="1" presetClass="entr" presetSubtype="0" fill="hold" nodeType="withEffect">
+                                  <p:stCondLst>
+                                    <p:cond delay="0"/>
+                                  </p:stCondLst>
+                                  <p:childTnLst>
+                                    <p:set>
+                                      <p:cBhvr>
+                                        <p:cTn id="34" dur="1" fill="hold">
+                                          <p:stCondLst>
+                                            <p:cond delay="0"/>
+                                          </p:stCondLst>
+                                        </p:cTn>
+                                        <p:tgtEl>
+                                          <p:spTgt spid="9"/>
+                                        </p:tgtEl>
+                                        <p:attrNameLst>
+                                          <p:attrName>style.visibility</p:attrName>
+                                        </p:attrNameLst>
+                                      </p:cBhvr>
+                                      <p:to>
+                                        <p:strVal val="visible"/>
+                                      </p:to>
+                                    </p:set>
+                                  </p:childTnLst>
+                                </p:cTn>
+                              </p:par>
+                              <p:par>
+                                <p:cTn id="35" presetID="1" presetClass="entr" presetSubtype="0" fill="hold" nodeType="withEffect">
+                                  <p:stCondLst>
+                                    <p:cond delay="0"/>
+                                  </p:stCondLst>
+                                  <p:childTnLst>
+                                    <p:set>
+                                      <p:cBhvr>
+                                        <p:cTn id="36" dur="1" fill="hold">
+                                          <p:stCondLst>
+                                            <p:cond delay="0"/>
+                                          </p:stCondLst>
+                                        </p:cTn>
+                                        <p:tgtEl>
+                                          <p:spTgt spid="10"/>
+                                        </p:tgtEl>
+                                        <p:attrNameLst>
+                                          <p:attrName>style.visibility</p:attrName>
+                                        </p:attrNameLst>
+                                      </p:cBhvr>
+                                      <p:to>
+                                        <p:strVal val="visible"/>
+                                      </p:to>
+                                    </p:set>
+                                  </p:childTnLst>
+                                </p:cTn>
+                              </p:par>
+                            </p:childTnLst>
+                          </p:cTn>
+                        </p:par>
+                      </p:childTnLst>
+                    </p:cTn>
+                  </p:par>
+                </p:childTnLst>
+              </p:cTn>
+              <p:prevCondLst>
+                <p:cond evt="onPrev" delay="0">
+                  <p:tgtEl>
+                    <p:sldTgt/>
+                  </p:tgtEl>
+                </p:cond>
+              </p:prevCondLst>
+              <p:nextCondLst>
+                <p:cond evt="onNext" delay="0">
+                  <p:tgtEl>
+                    <p:sldTgt/>
+                  </p:tgtEl>
+                </p:cond>
+              </p:nextCondLst>
+            </p:seq>
+          </p:childTnLst>
+        </p:cTn>
       </p:par>
     </p:tnLst>
+    <p:bldLst>
+      <p:bldP spid="89" grpId="0" animBg="1"/>
+      <p:bldP spid="90" grpId="0" animBg="1"/>
+      <p:bldP spid="91" grpId="0" animBg="1"/>
+      <p:bldP spid="92" grpId="0" animBg="1"/>
+      <p:bldP spid="93" grpId="0"/>
+      <p:bldP spid="94" grpId="0"/>
+      <p:bldP spid="95" grpId="0"/>
+      <p:bldP spid="96" grpId="0"/>
+      <p:bldP spid="97" grpId="0"/>
+      <p:bldP spid="98" grpId="0"/>
+      <p:bldP spid="99" grpId="0"/>
+      <p:bldP spid="101" grpId="0" animBg="1"/>
+      <p:bldP spid="105" grpId="0"/>
+      <p:bldP spid="89" grpId="1" animBg="1"/>
+      <p:bldP spid="90" grpId="1" animBg="1"/>
+      <p:bldP spid="91" grpId="1" animBg="1"/>
+      <p:bldP spid="92" grpId="1" animBg="1"/>
+      <p:bldP spid="93" grpId="1"/>
+      <p:bldP spid="94" grpId="1"/>
+      <p:bldP spid="95" grpId="1"/>
+      <p:bldP spid="96" grpId="1"/>
+      <p:bldP spid="97" grpId="1"/>
+      <p:bldP spid="98" grpId="1"/>
+      <p:bldP spid="99" grpId="1"/>
+      <p:bldP spid="101" grpId="1" animBg="1"/>
+      <p:bldP spid="105" grpId="1"/>
+    </p:bldLst>
   </p:timing>
 </p:sld>
 </file>

</xml_diff>